<commit_message>
Atualizando o projeto para a apresentacao
</commit_message>
<xml_diff>
--- a/T3/Apresentação.pptx
+++ b/T3/Apresentação.pptx
@@ -5,7 +5,15 @@
     <p:sldMasterId id="2147483648" r:id="rId1"/>
   </p:sldMasterIdLst>
   <p:sldIdLst>
-    <p:sldId id="256" r:id="rId2"/>
+    <p:sldId id="256" r:id="rId3"/>
+    <p:sldId id="257" r:id="rId4"/>
+    <p:sldId id="258" r:id="rId5"/>
+    <p:sldId id="259" r:id="rId6"/>
+    <p:sldId id="260" r:id="rId7"/>
+    <p:sldId id="261" r:id="rId8"/>
+    <p:sldId id="262" r:id="rId9"/>
+    <p:sldId id="263" r:id="rId10"/>
+    <p:sldId id="264" r:id="rId11"/>
   </p:sldIdLst>
   <p:sldSz cx="9144000" cy="6858000" type="screen4x3"/>
   <p:notesSz cx="6858000" cy="9144000"/>
@@ -159,7 +167,7 @@
             <a:spLocks noGrp="1"/>
           </p:cNvSpPr>
           <p:nvPr>
-            <p:ph type="subTitle" idx="1"/>
+            <p:ph type="subTitle" idx="1" hasCustomPrompt="1"/>
           </p:nvPr>
         </p:nvSpPr>
         <p:spPr>
@@ -288,7 +296,6 @@
           <a:p>
             <a:fld id="{DEE43914-70EA-4168-AB30-E2BC3C1594F7}" type="datetimeFigureOut">
               <a:rPr lang="pt-BR" smtClean="0"/>
-              <a:t>25/11/2016</a:t>
             </a:fld>
             <a:endParaRPr lang="pt-BR"/>
           </a:p>
@@ -330,18 +337,12 @@
           <a:p>
             <a:fld id="{2DF3D61F-31C4-4D80-A265-411786E5EB5C}" type="slidenum">
               <a:rPr lang="pt-BR" smtClean="0"/>
-              <a:t>‹nº›</a:t>
             </a:fld>
             <a:endParaRPr lang="pt-BR"/>
           </a:p>
         </p:txBody>
       </p:sp>
     </p:spTree>
-    <p:extLst>
-      <p:ext uri="{BB962C8B-B14F-4D97-AF65-F5344CB8AC3E}">
-        <p14:creationId xmlns:p14="http://schemas.microsoft.com/office/powerpoint/2010/main" val="1060979566"/>
-      </p:ext>
-    </p:extLst>
   </p:cSld>
   <p:clrMapOvr>
     <a:masterClrMapping/>
@@ -396,7 +397,7 @@
             <a:spLocks noGrp="1"/>
           </p:cNvSpPr>
           <p:nvPr>
-            <p:ph type="body" orient="vert" idx="1"/>
+            <p:ph type="body" orient="vert" idx="1" hasCustomPrompt="1"/>
           </p:nvPr>
         </p:nvSpPr>
         <p:spPr/>
@@ -409,6 +410,7 @@
               <a:rPr lang="pt-BR" smtClean="0"/>
               <a:t>Clique para editar o texto mestre</a:t>
             </a:r>
+            <a:endParaRPr lang="pt-BR" smtClean="0"/>
           </a:p>
           <a:p>
             <a:pPr lvl="1"/>
@@ -416,6 +418,7 @@
               <a:rPr lang="pt-BR" smtClean="0"/>
               <a:t>Segundo nível</a:t>
             </a:r>
+            <a:endParaRPr lang="pt-BR" smtClean="0"/>
           </a:p>
           <a:p>
             <a:pPr lvl="2"/>
@@ -423,6 +426,7 @@
               <a:rPr lang="pt-BR" smtClean="0"/>
               <a:t>Terceiro nível</a:t>
             </a:r>
+            <a:endParaRPr lang="pt-BR" smtClean="0"/>
           </a:p>
           <a:p>
             <a:pPr lvl="3"/>
@@ -430,6 +434,7 @@
               <a:rPr lang="pt-BR" smtClean="0"/>
               <a:t>Quarto nível</a:t>
             </a:r>
+            <a:endParaRPr lang="pt-BR" smtClean="0"/>
           </a:p>
           <a:p>
             <a:pPr lvl="4"/>
@@ -458,7 +463,6 @@
           <a:p>
             <a:fld id="{DEE43914-70EA-4168-AB30-E2BC3C1594F7}" type="datetimeFigureOut">
               <a:rPr lang="pt-BR" smtClean="0"/>
-              <a:t>25/11/2016</a:t>
             </a:fld>
             <a:endParaRPr lang="pt-BR"/>
           </a:p>
@@ -500,18 +504,12 @@
           <a:p>
             <a:fld id="{2DF3D61F-31C4-4D80-A265-411786E5EB5C}" type="slidenum">
               <a:rPr lang="pt-BR" smtClean="0"/>
-              <a:t>‹nº›</a:t>
             </a:fld>
             <a:endParaRPr lang="pt-BR"/>
           </a:p>
         </p:txBody>
       </p:sp>
     </p:spTree>
-    <p:extLst>
-      <p:ext uri="{BB962C8B-B14F-4D97-AF65-F5344CB8AC3E}">
-        <p14:creationId xmlns:p14="http://schemas.microsoft.com/office/powerpoint/2010/main" val="126048371"/>
-      </p:ext>
-    </p:extLst>
   </p:cSld>
   <p:clrMapOvr>
     <a:masterClrMapping/>
@@ -571,7 +569,7 @@
             <a:spLocks noGrp="1"/>
           </p:cNvSpPr>
           <p:nvPr>
-            <p:ph type="body" orient="vert" idx="1"/>
+            <p:ph type="body" orient="vert" idx="1" hasCustomPrompt="1"/>
           </p:nvPr>
         </p:nvSpPr>
         <p:spPr>
@@ -589,6 +587,7 @@
               <a:rPr lang="pt-BR" smtClean="0"/>
               <a:t>Clique para editar o texto mestre</a:t>
             </a:r>
+            <a:endParaRPr lang="pt-BR" smtClean="0"/>
           </a:p>
           <a:p>
             <a:pPr lvl="1"/>
@@ -596,6 +595,7 @@
               <a:rPr lang="pt-BR" smtClean="0"/>
               <a:t>Segundo nível</a:t>
             </a:r>
+            <a:endParaRPr lang="pt-BR" smtClean="0"/>
           </a:p>
           <a:p>
             <a:pPr lvl="2"/>
@@ -603,6 +603,7 @@
               <a:rPr lang="pt-BR" smtClean="0"/>
               <a:t>Terceiro nível</a:t>
             </a:r>
+            <a:endParaRPr lang="pt-BR" smtClean="0"/>
           </a:p>
           <a:p>
             <a:pPr lvl="3"/>
@@ -610,6 +611,7 @@
               <a:rPr lang="pt-BR" smtClean="0"/>
               <a:t>Quarto nível</a:t>
             </a:r>
+            <a:endParaRPr lang="pt-BR" smtClean="0"/>
           </a:p>
           <a:p>
             <a:pPr lvl="4"/>
@@ -638,7 +640,6 @@
           <a:p>
             <a:fld id="{DEE43914-70EA-4168-AB30-E2BC3C1594F7}" type="datetimeFigureOut">
               <a:rPr lang="pt-BR" smtClean="0"/>
-              <a:t>25/11/2016</a:t>
             </a:fld>
             <a:endParaRPr lang="pt-BR"/>
           </a:p>
@@ -680,18 +681,12 @@
           <a:p>
             <a:fld id="{2DF3D61F-31C4-4D80-A265-411786E5EB5C}" type="slidenum">
               <a:rPr lang="pt-BR" smtClean="0"/>
-              <a:t>‹nº›</a:t>
             </a:fld>
             <a:endParaRPr lang="pt-BR"/>
           </a:p>
         </p:txBody>
       </p:sp>
     </p:spTree>
-    <p:extLst>
-      <p:ext uri="{BB962C8B-B14F-4D97-AF65-F5344CB8AC3E}">
-        <p14:creationId xmlns:p14="http://schemas.microsoft.com/office/powerpoint/2010/main" val="2353885794"/>
-      </p:ext>
-    </p:extLst>
   </p:cSld>
   <p:clrMapOvr>
     <a:masterClrMapping/>
@@ -746,7 +741,7 @@
             <a:spLocks noGrp="1"/>
           </p:cNvSpPr>
           <p:nvPr>
-            <p:ph idx="1"/>
+            <p:ph idx="1" hasCustomPrompt="1"/>
           </p:nvPr>
         </p:nvSpPr>
         <p:spPr/>
@@ -759,6 +754,7 @@
               <a:rPr lang="pt-BR" smtClean="0"/>
               <a:t>Clique para editar o texto mestre</a:t>
             </a:r>
+            <a:endParaRPr lang="pt-BR" smtClean="0"/>
           </a:p>
           <a:p>
             <a:pPr lvl="1"/>
@@ -766,6 +762,7 @@
               <a:rPr lang="pt-BR" smtClean="0"/>
               <a:t>Segundo nível</a:t>
             </a:r>
+            <a:endParaRPr lang="pt-BR" smtClean="0"/>
           </a:p>
           <a:p>
             <a:pPr lvl="2"/>
@@ -773,6 +770,7 @@
               <a:rPr lang="pt-BR" smtClean="0"/>
               <a:t>Terceiro nível</a:t>
             </a:r>
+            <a:endParaRPr lang="pt-BR" smtClean="0"/>
           </a:p>
           <a:p>
             <a:pPr lvl="3"/>
@@ -780,6 +778,7 @@
               <a:rPr lang="pt-BR" smtClean="0"/>
               <a:t>Quarto nível</a:t>
             </a:r>
+            <a:endParaRPr lang="pt-BR" smtClean="0"/>
           </a:p>
           <a:p>
             <a:pPr lvl="4"/>
@@ -808,7 +807,6 @@
           <a:p>
             <a:fld id="{DEE43914-70EA-4168-AB30-E2BC3C1594F7}" type="datetimeFigureOut">
               <a:rPr lang="pt-BR" smtClean="0"/>
-              <a:t>25/11/2016</a:t>
             </a:fld>
             <a:endParaRPr lang="pt-BR"/>
           </a:p>
@@ -850,18 +848,12 @@
           <a:p>
             <a:fld id="{2DF3D61F-31C4-4D80-A265-411786E5EB5C}" type="slidenum">
               <a:rPr lang="pt-BR" smtClean="0"/>
-              <a:t>‹nº›</a:t>
             </a:fld>
             <a:endParaRPr lang="pt-BR"/>
           </a:p>
         </p:txBody>
       </p:sp>
     </p:spTree>
-    <p:extLst>
-      <p:ext uri="{BB962C8B-B14F-4D97-AF65-F5344CB8AC3E}">
-        <p14:creationId xmlns:p14="http://schemas.microsoft.com/office/powerpoint/2010/main" val="1148967926"/>
-      </p:ext>
-    </p:extLst>
   </p:cSld>
   <p:clrMapOvr>
     <a:masterClrMapping/>
@@ -925,7 +917,7 @@
             <a:spLocks noGrp="1"/>
           </p:cNvSpPr>
           <p:nvPr>
-            <p:ph type="body" idx="1"/>
+            <p:ph type="body" idx="1" hasCustomPrompt="1"/>
           </p:nvPr>
         </p:nvSpPr>
         <p:spPr>
@@ -1054,7 +1046,6 @@
           <a:p>
             <a:fld id="{DEE43914-70EA-4168-AB30-E2BC3C1594F7}" type="datetimeFigureOut">
               <a:rPr lang="pt-BR" smtClean="0"/>
-              <a:t>25/11/2016</a:t>
             </a:fld>
             <a:endParaRPr lang="pt-BR"/>
           </a:p>
@@ -1096,18 +1087,12 @@
           <a:p>
             <a:fld id="{2DF3D61F-31C4-4D80-A265-411786E5EB5C}" type="slidenum">
               <a:rPr lang="pt-BR" smtClean="0"/>
-              <a:t>‹nº›</a:t>
             </a:fld>
             <a:endParaRPr lang="pt-BR"/>
           </a:p>
         </p:txBody>
       </p:sp>
     </p:spTree>
-    <p:extLst>
-      <p:ext uri="{BB962C8B-B14F-4D97-AF65-F5344CB8AC3E}">
-        <p14:creationId xmlns:p14="http://schemas.microsoft.com/office/powerpoint/2010/main" val="106528938"/>
-      </p:ext>
-    </p:extLst>
   </p:cSld>
   <p:clrMapOvr>
     <a:masterClrMapping/>
@@ -1162,7 +1147,7 @@
             <a:spLocks noGrp="1"/>
           </p:cNvSpPr>
           <p:nvPr>
-            <p:ph sz="half" idx="1"/>
+            <p:ph sz="half" idx="1" hasCustomPrompt="1"/>
           </p:nvPr>
         </p:nvSpPr>
         <p:spPr>
@@ -1208,6 +1193,7 @@
               <a:rPr lang="pt-BR" smtClean="0"/>
               <a:t>Clique para editar o texto mestre</a:t>
             </a:r>
+            <a:endParaRPr lang="pt-BR" smtClean="0"/>
           </a:p>
           <a:p>
             <a:pPr lvl="1"/>
@@ -1215,6 +1201,7 @@
               <a:rPr lang="pt-BR" smtClean="0"/>
               <a:t>Segundo nível</a:t>
             </a:r>
+            <a:endParaRPr lang="pt-BR" smtClean="0"/>
           </a:p>
           <a:p>
             <a:pPr lvl="2"/>
@@ -1222,6 +1209,7 @@
               <a:rPr lang="pt-BR" smtClean="0"/>
               <a:t>Terceiro nível</a:t>
             </a:r>
+            <a:endParaRPr lang="pt-BR" smtClean="0"/>
           </a:p>
           <a:p>
             <a:pPr lvl="3"/>
@@ -1229,6 +1217,7 @@
               <a:rPr lang="pt-BR" smtClean="0"/>
               <a:t>Quarto nível</a:t>
             </a:r>
+            <a:endParaRPr lang="pt-BR" smtClean="0"/>
           </a:p>
           <a:p>
             <a:pPr lvl="4"/>
@@ -1247,7 +1236,7 @@
             <a:spLocks noGrp="1"/>
           </p:cNvSpPr>
           <p:nvPr>
-            <p:ph sz="half" idx="2"/>
+            <p:ph sz="half" idx="2" hasCustomPrompt="1"/>
           </p:nvPr>
         </p:nvSpPr>
         <p:spPr>
@@ -1293,6 +1282,7 @@
               <a:rPr lang="pt-BR" smtClean="0"/>
               <a:t>Clique para editar o texto mestre</a:t>
             </a:r>
+            <a:endParaRPr lang="pt-BR" smtClean="0"/>
           </a:p>
           <a:p>
             <a:pPr lvl="1"/>
@@ -1300,6 +1290,7 @@
               <a:rPr lang="pt-BR" smtClean="0"/>
               <a:t>Segundo nível</a:t>
             </a:r>
+            <a:endParaRPr lang="pt-BR" smtClean="0"/>
           </a:p>
           <a:p>
             <a:pPr lvl="2"/>
@@ -1307,6 +1298,7 @@
               <a:rPr lang="pt-BR" smtClean="0"/>
               <a:t>Terceiro nível</a:t>
             </a:r>
+            <a:endParaRPr lang="pt-BR" smtClean="0"/>
           </a:p>
           <a:p>
             <a:pPr lvl="3"/>
@@ -1314,6 +1306,7 @@
               <a:rPr lang="pt-BR" smtClean="0"/>
               <a:t>Quarto nível</a:t>
             </a:r>
+            <a:endParaRPr lang="pt-BR" smtClean="0"/>
           </a:p>
           <a:p>
             <a:pPr lvl="4"/>
@@ -1342,7 +1335,6 @@
           <a:p>
             <a:fld id="{DEE43914-70EA-4168-AB30-E2BC3C1594F7}" type="datetimeFigureOut">
               <a:rPr lang="pt-BR" smtClean="0"/>
-              <a:t>25/11/2016</a:t>
             </a:fld>
             <a:endParaRPr lang="pt-BR"/>
           </a:p>
@@ -1384,18 +1376,12 @@
           <a:p>
             <a:fld id="{2DF3D61F-31C4-4D80-A265-411786E5EB5C}" type="slidenum">
               <a:rPr lang="pt-BR" smtClean="0"/>
-              <a:t>‹nº›</a:t>
             </a:fld>
             <a:endParaRPr lang="pt-BR"/>
           </a:p>
         </p:txBody>
       </p:sp>
     </p:spTree>
-    <p:extLst>
-      <p:ext uri="{BB962C8B-B14F-4D97-AF65-F5344CB8AC3E}">
-        <p14:creationId xmlns:p14="http://schemas.microsoft.com/office/powerpoint/2010/main" val="756837885"/>
-      </p:ext>
-    </p:extLst>
   </p:cSld>
   <p:clrMapOvr>
     <a:masterClrMapping/>
@@ -1454,7 +1440,7 @@
             <a:spLocks noGrp="1"/>
           </p:cNvSpPr>
           <p:nvPr>
-            <p:ph type="body" idx="1"/>
+            <p:ph type="body" idx="1" hasCustomPrompt="1"/>
           </p:nvPr>
         </p:nvSpPr>
         <p:spPr>
@@ -1519,7 +1505,7 @@
             <a:spLocks noGrp="1"/>
           </p:cNvSpPr>
           <p:nvPr>
-            <p:ph sz="half" idx="2"/>
+            <p:ph sz="half" idx="2" hasCustomPrompt="1"/>
           </p:nvPr>
         </p:nvSpPr>
         <p:spPr>
@@ -1565,6 +1551,7 @@
               <a:rPr lang="pt-BR" smtClean="0"/>
               <a:t>Clique para editar o texto mestre</a:t>
             </a:r>
+            <a:endParaRPr lang="pt-BR" smtClean="0"/>
           </a:p>
           <a:p>
             <a:pPr lvl="1"/>
@@ -1572,6 +1559,7 @@
               <a:rPr lang="pt-BR" smtClean="0"/>
               <a:t>Segundo nível</a:t>
             </a:r>
+            <a:endParaRPr lang="pt-BR" smtClean="0"/>
           </a:p>
           <a:p>
             <a:pPr lvl="2"/>
@@ -1579,6 +1567,7 @@
               <a:rPr lang="pt-BR" smtClean="0"/>
               <a:t>Terceiro nível</a:t>
             </a:r>
+            <a:endParaRPr lang="pt-BR" smtClean="0"/>
           </a:p>
           <a:p>
             <a:pPr lvl="3"/>
@@ -1586,6 +1575,7 @@
               <a:rPr lang="pt-BR" smtClean="0"/>
               <a:t>Quarto nível</a:t>
             </a:r>
+            <a:endParaRPr lang="pt-BR" smtClean="0"/>
           </a:p>
           <a:p>
             <a:pPr lvl="4"/>
@@ -1604,7 +1594,7 @@
             <a:spLocks noGrp="1"/>
           </p:cNvSpPr>
           <p:nvPr>
-            <p:ph type="body" sz="quarter" idx="3"/>
+            <p:ph type="body" sz="quarter" idx="3" hasCustomPrompt="1"/>
           </p:nvPr>
         </p:nvSpPr>
         <p:spPr>
@@ -1669,7 +1659,7 @@
             <a:spLocks noGrp="1"/>
           </p:cNvSpPr>
           <p:nvPr>
-            <p:ph sz="quarter" idx="4"/>
+            <p:ph sz="quarter" idx="4" hasCustomPrompt="1"/>
           </p:nvPr>
         </p:nvSpPr>
         <p:spPr>
@@ -1715,6 +1705,7 @@
               <a:rPr lang="pt-BR" smtClean="0"/>
               <a:t>Clique para editar o texto mestre</a:t>
             </a:r>
+            <a:endParaRPr lang="pt-BR" smtClean="0"/>
           </a:p>
           <a:p>
             <a:pPr lvl="1"/>
@@ -1722,6 +1713,7 @@
               <a:rPr lang="pt-BR" smtClean="0"/>
               <a:t>Segundo nível</a:t>
             </a:r>
+            <a:endParaRPr lang="pt-BR" smtClean="0"/>
           </a:p>
           <a:p>
             <a:pPr lvl="2"/>
@@ -1729,6 +1721,7 @@
               <a:rPr lang="pt-BR" smtClean="0"/>
               <a:t>Terceiro nível</a:t>
             </a:r>
+            <a:endParaRPr lang="pt-BR" smtClean="0"/>
           </a:p>
           <a:p>
             <a:pPr lvl="3"/>
@@ -1736,6 +1729,7 @@
               <a:rPr lang="pt-BR" smtClean="0"/>
               <a:t>Quarto nível</a:t>
             </a:r>
+            <a:endParaRPr lang="pt-BR" smtClean="0"/>
           </a:p>
           <a:p>
             <a:pPr lvl="4"/>
@@ -1764,7 +1758,6 @@
           <a:p>
             <a:fld id="{DEE43914-70EA-4168-AB30-E2BC3C1594F7}" type="datetimeFigureOut">
               <a:rPr lang="pt-BR" smtClean="0"/>
-              <a:t>25/11/2016</a:t>
             </a:fld>
             <a:endParaRPr lang="pt-BR"/>
           </a:p>
@@ -1806,18 +1799,12 @@
           <a:p>
             <a:fld id="{2DF3D61F-31C4-4D80-A265-411786E5EB5C}" type="slidenum">
               <a:rPr lang="pt-BR" smtClean="0"/>
-              <a:t>‹nº›</a:t>
             </a:fld>
             <a:endParaRPr lang="pt-BR"/>
           </a:p>
         </p:txBody>
       </p:sp>
     </p:spTree>
-    <p:extLst>
-      <p:ext uri="{BB962C8B-B14F-4D97-AF65-F5344CB8AC3E}">
-        <p14:creationId xmlns:p14="http://schemas.microsoft.com/office/powerpoint/2010/main" val="973782670"/>
-      </p:ext>
-    </p:extLst>
   </p:cSld>
   <p:clrMapOvr>
     <a:masterClrMapping/>
@@ -1882,7 +1869,6 @@
           <a:p>
             <a:fld id="{DEE43914-70EA-4168-AB30-E2BC3C1594F7}" type="datetimeFigureOut">
               <a:rPr lang="pt-BR" smtClean="0"/>
-              <a:t>25/11/2016</a:t>
             </a:fld>
             <a:endParaRPr lang="pt-BR"/>
           </a:p>
@@ -1924,18 +1910,12 @@
           <a:p>
             <a:fld id="{2DF3D61F-31C4-4D80-A265-411786E5EB5C}" type="slidenum">
               <a:rPr lang="pt-BR" smtClean="0"/>
-              <a:t>‹nº›</a:t>
             </a:fld>
             <a:endParaRPr lang="pt-BR"/>
           </a:p>
         </p:txBody>
       </p:sp>
     </p:spTree>
-    <p:extLst>
-      <p:ext uri="{BB962C8B-B14F-4D97-AF65-F5344CB8AC3E}">
-        <p14:creationId xmlns:p14="http://schemas.microsoft.com/office/powerpoint/2010/main" val="872958509"/>
-      </p:ext>
-    </p:extLst>
   </p:cSld>
   <p:clrMapOvr>
     <a:masterClrMapping/>
@@ -1977,7 +1957,6 @@
           <a:p>
             <a:fld id="{DEE43914-70EA-4168-AB30-E2BC3C1594F7}" type="datetimeFigureOut">
               <a:rPr lang="pt-BR" smtClean="0"/>
-              <a:t>25/11/2016</a:t>
             </a:fld>
             <a:endParaRPr lang="pt-BR"/>
           </a:p>
@@ -2019,18 +1998,12 @@
           <a:p>
             <a:fld id="{2DF3D61F-31C4-4D80-A265-411786E5EB5C}" type="slidenum">
               <a:rPr lang="pt-BR" smtClean="0"/>
-              <a:t>‹nº›</a:t>
             </a:fld>
             <a:endParaRPr lang="pt-BR"/>
           </a:p>
         </p:txBody>
       </p:sp>
     </p:spTree>
-    <p:extLst>
-      <p:ext uri="{BB962C8B-B14F-4D97-AF65-F5344CB8AC3E}">
-        <p14:creationId xmlns:p14="http://schemas.microsoft.com/office/powerpoint/2010/main" val="316793382"/>
-      </p:ext>
-    </p:extLst>
   </p:cSld>
   <p:clrMapOvr>
     <a:masterClrMapping/>
@@ -2094,7 +2067,7 @@
             <a:spLocks noGrp="1"/>
           </p:cNvSpPr>
           <p:nvPr>
-            <p:ph idx="1"/>
+            <p:ph idx="1" hasCustomPrompt="1"/>
           </p:nvPr>
         </p:nvSpPr>
         <p:spPr>
@@ -2140,6 +2113,7 @@
               <a:rPr lang="pt-BR" smtClean="0"/>
               <a:t>Clique para editar o texto mestre</a:t>
             </a:r>
+            <a:endParaRPr lang="pt-BR" smtClean="0"/>
           </a:p>
           <a:p>
             <a:pPr lvl="1"/>
@@ -2147,6 +2121,7 @@
               <a:rPr lang="pt-BR" smtClean="0"/>
               <a:t>Segundo nível</a:t>
             </a:r>
+            <a:endParaRPr lang="pt-BR" smtClean="0"/>
           </a:p>
           <a:p>
             <a:pPr lvl="2"/>
@@ -2154,6 +2129,7 @@
               <a:rPr lang="pt-BR" smtClean="0"/>
               <a:t>Terceiro nível</a:t>
             </a:r>
+            <a:endParaRPr lang="pt-BR" smtClean="0"/>
           </a:p>
           <a:p>
             <a:pPr lvl="3"/>
@@ -2161,6 +2137,7 @@
               <a:rPr lang="pt-BR" smtClean="0"/>
               <a:t>Quarto nível</a:t>
             </a:r>
+            <a:endParaRPr lang="pt-BR" smtClean="0"/>
           </a:p>
           <a:p>
             <a:pPr lvl="4"/>
@@ -2179,7 +2156,7 @@
             <a:spLocks noGrp="1"/>
           </p:cNvSpPr>
           <p:nvPr>
-            <p:ph type="body" sz="half" idx="2"/>
+            <p:ph type="body" sz="half" idx="2" hasCustomPrompt="1"/>
           </p:nvPr>
         </p:nvSpPr>
         <p:spPr>
@@ -2254,7 +2231,6 @@
           <a:p>
             <a:fld id="{DEE43914-70EA-4168-AB30-E2BC3C1594F7}" type="datetimeFigureOut">
               <a:rPr lang="pt-BR" smtClean="0"/>
-              <a:t>25/11/2016</a:t>
             </a:fld>
             <a:endParaRPr lang="pt-BR"/>
           </a:p>
@@ -2296,18 +2272,12 @@
           <a:p>
             <a:fld id="{2DF3D61F-31C4-4D80-A265-411786E5EB5C}" type="slidenum">
               <a:rPr lang="pt-BR" smtClean="0"/>
-              <a:t>‹nº›</a:t>
             </a:fld>
             <a:endParaRPr lang="pt-BR"/>
           </a:p>
         </p:txBody>
       </p:sp>
     </p:spTree>
-    <p:extLst>
-      <p:ext uri="{BB962C8B-B14F-4D97-AF65-F5344CB8AC3E}">
-        <p14:creationId xmlns:p14="http://schemas.microsoft.com/office/powerpoint/2010/main" val="602159035"/>
-      </p:ext>
-    </p:extLst>
   </p:cSld>
   <p:clrMapOvr>
     <a:masterClrMapping/>
@@ -2432,7 +2402,7 @@
             <a:spLocks noGrp="1"/>
           </p:cNvSpPr>
           <p:nvPr>
-            <p:ph type="body" sz="half" idx="2"/>
+            <p:ph type="body" sz="half" idx="2" hasCustomPrompt="1"/>
           </p:nvPr>
         </p:nvSpPr>
         <p:spPr>
@@ -2507,7 +2477,6 @@
           <a:p>
             <a:fld id="{DEE43914-70EA-4168-AB30-E2BC3C1594F7}" type="datetimeFigureOut">
               <a:rPr lang="pt-BR" smtClean="0"/>
-              <a:t>25/11/2016</a:t>
             </a:fld>
             <a:endParaRPr lang="pt-BR"/>
           </a:p>
@@ -2549,18 +2518,12 @@
           <a:p>
             <a:fld id="{2DF3D61F-31C4-4D80-A265-411786E5EB5C}" type="slidenum">
               <a:rPr lang="pt-BR" smtClean="0"/>
-              <a:t>‹nº›</a:t>
             </a:fld>
             <a:endParaRPr lang="pt-BR"/>
           </a:p>
         </p:txBody>
       </p:sp>
     </p:spTree>
-    <p:extLst>
-      <p:ext uri="{BB962C8B-B14F-4D97-AF65-F5344CB8AC3E}">
-        <p14:creationId xmlns:p14="http://schemas.microsoft.com/office/powerpoint/2010/main" val="1826323785"/>
-      </p:ext>
-    </p:extLst>
   </p:cSld>
   <p:clrMapOvr>
     <a:masterClrMapping/>
@@ -2653,6 +2616,7 @@
               <a:rPr lang="pt-BR" smtClean="0"/>
               <a:t>Clique para editar o texto mestre</a:t>
             </a:r>
+            <a:endParaRPr lang="pt-BR" smtClean="0"/>
           </a:p>
           <a:p>
             <a:pPr lvl="1"/>
@@ -2660,6 +2624,7 @@
               <a:rPr lang="pt-BR" smtClean="0"/>
               <a:t>Segundo nível</a:t>
             </a:r>
+            <a:endParaRPr lang="pt-BR" smtClean="0"/>
           </a:p>
           <a:p>
             <a:pPr lvl="2"/>
@@ -2667,6 +2632,7 @@
               <a:rPr lang="pt-BR" smtClean="0"/>
               <a:t>Terceiro nível</a:t>
             </a:r>
+            <a:endParaRPr lang="pt-BR" smtClean="0"/>
           </a:p>
           <a:p>
             <a:pPr lvl="3"/>
@@ -2674,6 +2640,7 @@
               <a:rPr lang="pt-BR" smtClean="0"/>
               <a:t>Quarto nível</a:t>
             </a:r>
+            <a:endParaRPr lang="pt-BR" smtClean="0"/>
           </a:p>
           <a:p>
             <a:pPr lvl="4"/>
@@ -2720,7 +2687,6 @@
           <a:p>
             <a:fld id="{DEE43914-70EA-4168-AB30-E2BC3C1594F7}" type="datetimeFigureOut">
               <a:rPr lang="pt-BR" smtClean="0"/>
-              <a:t>25/11/2016</a:t>
             </a:fld>
             <a:endParaRPr lang="pt-BR"/>
           </a:p>
@@ -2798,18 +2764,12 @@
           <a:p>
             <a:fld id="{2DF3D61F-31C4-4D80-A265-411786E5EB5C}" type="slidenum">
               <a:rPr lang="pt-BR" smtClean="0"/>
-              <a:t>‹nº›</a:t>
             </a:fld>
             <a:endParaRPr lang="pt-BR"/>
           </a:p>
         </p:txBody>
       </p:sp>
     </p:spTree>
-    <p:extLst>
-      <p:ext uri="{BB962C8B-B14F-4D97-AF65-F5344CB8AC3E}">
-        <p14:creationId xmlns:p14="http://schemas.microsoft.com/office/powerpoint/2010/main" val="3746929913"/>
-      </p:ext>
-    </p:extLst>
   </p:cSld>
   <p:clrMap bg1="lt1" tx1="dk1" bg2="lt2" tx2="dk2" accent1="accent1" accent2="accent2" accent3="accent3" accent4="accent4" accent5="accent5" accent6="accent6" hlink="hlink" folHlink="folHlink"/>
   <p:sldLayoutIdLst>
@@ -2847,7 +2807,7 @@
         <a:spcBef>
           <a:spcPct val="20000"/>
         </a:spcBef>
-        <a:buFont typeface="Arial" panose="020B0604020202020204" pitchFamily="34" charset="0"/>
+        <a:buFont typeface="Arial" pitchFamily="34" charset="0"/>
         <a:buChar char="•"/>
         <a:defRPr sz="3200" kern="1200">
           <a:solidFill>
@@ -2862,7 +2822,7 @@
         <a:spcBef>
           <a:spcPct val="20000"/>
         </a:spcBef>
-        <a:buFont typeface="Arial" panose="020B0604020202020204" pitchFamily="34" charset="0"/>
+        <a:buFont typeface="Arial" pitchFamily="34" charset="0"/>
         <a:buChar char="–"/>
         <a:defRPr sz="2800" kern="1200">
           <a:solidFill>
@@ -2877,7 +2837,7 @@
         <a:spcBef>
           <a:spcPct val="20000"/>
         </a:spcBef>
-        <a:buFont typeface="Arial" panose="020B0604020202020204" pitchFamily="34" charset="0"/>
+        <a:buFont typeface="Arial" pitchFamily="34" charset="0"/>
         <a:buChar char="•"/>
         <a:defRPr sz="2400" kern="1200">
           <a:solidFill>
@@ -2892,7 +2852,7 @@
         <a:spcBef>
           <a:spcPct val="20000"/>
         </a:spcBef>
-        <a:buFont typeface="Arial" panose="020B0604020202020204" pitchFamily="34" charset="0"/>
+        <a:buFont typeface="Arial" pitchFamily="34" charset="0"/>
         <a:buChar char="–"/>
         <a:defRPr sz="2000" kern="1200">
           <a:solidFill>
@@ -2907,7 +2867,7 @@
         <a:spcBef>
           <a:spcPct val="20000"/>
         </a:spcBef>
-        <a:buFont typeface="Arial" panose="020B0604020202020204" pitchFamily="34" charset="0"/>
+        <a:buFont typeface="Arial" pitchFamily="34" charset="0"/>
         <a:buChar char="»"/>
         <a:defRPr sz="2000" kern="1200">
           <a:solidFill>
@@ -2922,7 +2882,7 @@
         <a:spcBef>
           <a:spcPct val="20000"/>
         </a:spcBef>
-        <a:buFont typeface="Arial" panose="020B0604020202020204" pitchFamily="34" charset="0"/>
+        <a:buFont typeface="Arial" pitchFamily="34" charset="0"/>
         <a:buChar char="•"/>
         <a:defRPr sz="2000" kern="1200">
           <a:solidFill>
@@ -2937,7 +2897,7 @@
         <a:spcBef>
           <a:spcPct val="20000"/>
         </a:spcBef>
-        <a:buFont typeface="Arial" panose="020B0604020202020204" pitchFamily="34" charset="0"/>
+        <a:buFont typeface="Arial" pitchFamily="34" charset="0"/>
         <a:buChar char="•"/>
         <a:defRPr sz="2000" kern="1200">
           <a:solidFill>
@@ -2952,7 +2912,7 @@
         <a:spcBef>
           <a:spcPct val="20000"/>
         </a:spcBef>
-        <a:buFont typeface="Arial" panose="020B0604020202020204" pitchFamily="34" charset="0"/>
+        <a:buFont typeface="Arial" pitchFamily="34" charset="0"/>
         <a:buChar char="•"/>
         <a:defRPr sz="2000" kern="1200">
           <a:solidFill>
@@ -2967,7 +2927,7 @@
         <a:spcBef>
           <a:spcPct val="20000"/>
         </a:spcBef>
-        <a:buFont typeface="Arial" panose="020B0604020202020204" pitchFamily="34" charset="0"/>
+        <a:buFont typeface="Arial" pitchFamily="34" charset="0"/>
         <a:buChar char="•"/>
         <a:defRPr sz="2000" kern="1200">
           <a:solidFill>
@@ -3138,11 +3098,945 @@
         </p:txBody>
       </p:sp>
     </p:spTree>
-    <p:extLst>
-      <p:ext uri="{BB962C8B-B14F-4D97-AF65-F5344CB8AC3E}">
-        <p14:creationId xmlns:p14="http://schemas.microsoft.com/office/powerpoint/2010/main" val="3916542429"/>
-      </p:ext>
-    </p:extLst>
+  </p:cSld>
+  <p:clrMapOvr>
+    <a:masterClrMapping/>
+  </p:clrMapOvr>
+</p:sld>
+</file>
+
+<file path=ppt/slides/slide2.xml><?xml version="1.0" encoding="utf-8"?>
+<p:sld xmlns:a="http://schemas.openxmlformats.org/drawingml/2006/main" xmlns:r="http://schemas.openxmlformats.org/officeDocument/2006/relationships" xmlns:p="http://schemas.openxmlformats.org/presentationml/2006/main">
+  <p:cSld>
+    <p:spTree>
+      <p:nvGrpSpPr>
+        <p:cNvPr id="1" name=""/>
+        <p:cNvGrpSpPr/>
+        <p:nvPr/>
+      </p:nvGrpSpPr>
+      <p:grpSpPr/>
+      <p:sp>
+        <p:nvSpPr>
+          <p:cNvPr id="2" name="Título 1"/>
+          <p:cNvSpPr>
+            <a:spLocks noGrp="1"/>
+          </p:cNvSpPr>
+          <p:nvPr>
+            <p:ph type="title"/>
+          </p:nvPr>
+        </p:nvSpPr>
+        <p:spPr/>
+        <p:txBody>
+          <a:bodyPr/>
+          <a:p>
+            <a:r>
+              <a:rPr lang="pt-BR" altLang="en-US"/>
+              <a:t>Equipe</a:t>
+            </a:r>
+            <a:endParaRPr lang="pt-BR" altLang="en-US"/>
+          </a:p>
+        </p:txBody>
+      </p:sp>
+      <p:graphicFrame>
+        <p:nvGraphicFramePr>
+          <p:cNvPr id="4" name="Espaço Reservado para Conteúdo 3"/>
+          <p:cNvGraphicFramePr/>
+          <p:nvPr>
+            <p:ph idx="1"/>
+          </p:nvPr>
+        </p:nvGraphicFramePr>
+        <p:xfrm>
+          <a:off x="251460" y="2204720"/>
+          <a:ext cx="8561070" cy="2286000"/>
+        </p:xfrm>
+        <a:graphic>
+          <a:graphicData uri="http://schemas.openxmlformats.org/drawingml/2006/table">
+            <a:tbl>
+              <a:tblPr firstRow="1" bandRow="1">
+                <a:tableStyleId>{5C22544A-7EE6-4342-B048-85BDC9FD1C3A}</a:tableStyleId>
+              </a:tblPr>
+              <a:tblGrid>
+                <a:gridCol w="2140585"/>
+                <a:gridCol w="2139950"/>
+                <a:gridCol w="2140585"/>
+                <a:gridCol w="2139950"/>
+              </a:tblGrid>
+              <a:tr h="381000">
+                <a:tc>
+                  <a:txBody>
+                    <a:bodyPr/>
+                    <a:p>
+                      <a:pPr>
+                        <a:buNone/>
+                      </a:pPr>
+                      <a:r>
+                        <a:rPr lang="pt-BR"/>
+                        <a:t>Membros</a:t>
+                      </a:r>
+                      <a:endParaRPr lang="pt-BR"/>
+                    </a:p>
+                  </a:txBody>
+                  <a:tcPr/>
+                </a:tc>
+                <a:tc>
+                  <a:txBody>
+                    <a:bodyPr/>
+                    <a:p>
+                      <a:pPr algn="ctr">
+                        <a:buNone/>
+                      </a:pPr>
+                      <a:r>
+                        <a:rPr lang="pt-BR"/>
+                        <a:t>Bruno Costa</a:t>
+                      </a:r>
+                      <a:endParaRPr lang="pt-BR"/>
+                    </a:p>
+                  </a:txBody>
+                  <a:tcPr/>
+                </a:tc>
+                <a:tc>
+                  <a:txBody>
+                    <a:bodyPr/>
+                    <a:p>
+                      <a:pPr algn="ctr">
+                        <a:buNone/>
+                      </a:pPr>
+                      <a:r>
+                        <a:rPr lang="pt-BR"/>
+                        <a:t>João Fanti</a:t>
+                      </a:r>
+                      <a:endParaRPr lang="pt-BR"/>
+                    </a:p>
+                  </a:txBody>
+                  <a:tcPr/>
+                </a:tc>
+                <a:tc>
+                  <a:txBody>
+                    <a:bodyPr/>
+                    <a:p>
+                      <a:pPr algn="ctr">
+                        <a:buNone/>
+                      </a:pPr>
+                      <a:r>
+                        <a:rPr lang="pt-BR"/>
+                        <a:t>Fernando Vintacourt</a:t>
+                      </a:r>
+                      <a:endParaRPr lang="pt-BR"/>
+                    </a:p>
+                  </a:txBody>
+                  <a:tcPr/>
+                </a:tc>
+              </a:tr>
+              <a:tr h="381000">
+                <a:tc>
+                  <a:txBody>
+                    <a:bodyPr/>
+                    <a:p>
+                      <a:pPr>
+                        <a:buNone/>
+                      </a:pPr>
+                      <a:r>
+                        <a:rPr lang="pt-BR"/>
+                        <a:t>Gerente De Projeto</a:t>
+                      </a:r>
+                      <a:endParaRPr lang="pt-BR"/>
+                    </a:p>
+                  </a:txBody>
+                  <a:tcPr/>
+                </a:tc>
+                <a:tc>
+                  <a:txBody>
+                    <a:bodyPr/>
+                    <a:p>
+                      <a:pPr algn="ctr">
+                        <a:buNone/>
+                      </a:pPr>
+                      <a:endParaRPr lang="pt-BR"/>
+                    </a:p>
+                  </a:txBody>
+                  <a:tcPr/>
+                </a:tc>
+                <a:tc>
+                  <a:txBody>
+                    <a:bodyPr/>
+                    <a:p>
+                      <a:pPr algn="ctr">
+                        <a:buNone/>
+                      </a:pPr>
+                      <a:r>
+                        <a:rPr lang="pt-BR"/>
+                        <a:t>X</a:t>
+                      </a:r>
+                      <a:endParaRPr lang="pt-BR"/>
+                    </a:p>
+                  </a:txBody>
+                  <a:tcPr/>
+                </a:tc>
+                <a:tc>
+                  <a:txBody>
+                    <a:bodyPr/>
+                    <a:p>
+                      <a:pPr algn="ctr">
+                        <a:buNone/>
+                      </a:pPr>
+                    </a:p>
+                  </a:txBody>
+                  <a:tcPr/>
+                </a:tc>
+              </a:tr>
+              <a:tr h="381000">
+                <a:tc>
+                  <a:txBody>
+                    <a:bodyPr/>
+                    <a:p>
+                      <a:pPr>
+                        <a:buNone/>
+                      </a:pPr>
+                      <a:r>
+                        <a:rPr lang="pt-BR"/>
+                        <a:t>Arquiteto</a:t>
+                      </a:r>
+                      <a:endParaRPr lang="pt-BR"/>
+                    </a:p>
+                  </a:txBody>
+                  <a:tcPr/>
+                </a:tc>
+                <a:tc>
+                  <a:txBody>
+                    <a:bodyPr/>
+                    <a:p>
+                      <a:pPr algn="ctr">
+                        <a:buNone/>
+                      </a:pPr>
+                      <a:r>
+                        <a:rPr lang="pt-BR"/>
+                        <a:t>X</a:t>
+                      </a:r>
+                      <a:endParaRPr lang="pt-BR"/>
+                    </a:p>
+                  </a:txBody>
+                  <a:tcPr/>
+                </a:tc>
+                <a:tc>
+                  <a:txBody>
+                    <a:bodyPr/>
+                    <a:p>
+                      <a:pPr algn="ctr">
+                        <a:buNone/>
+                      </a:pPr>
+                    </a:p>
+                  </a:txBody>
+                  <a:tcPr/>
+                </a:tc>
+                <a:tc>
+                  <a:txBody>
+                    <a:bodyPr/>
+                    <a:p>
+                      <a:pPr algn="ctr">
+                        <a:buNone/>
+                      </a:pPr>
+                    </a:p>
+                  </a:txBody>
+                  <a:tcPr/>
+                </a:tc>
+              </a:tr>
+              <a:tr h="381000">
+                <a:tc>
+                  <a:txBody>
+                    <a:bodyPr/>
+                    <a:p>
+                      <a:pPr>
+                        <a:buNone/>
+                      </a:pPr>
+                      <a:r>
+                        <a:rPr lang="pt-BR"/>
+                        <a:t>Analista</a:t>
+                      </a:r>
+                      <a:endParaRPr lang="pt-BR"/>
+                    </a:p>
+                  </a:txBody>
+                  <a:tcPr/>
+                </a:tc>
+                <a:tc>
+                  <a:txBody>
+                    <a:bodyPr/>
+                    <a:p>
+                      <a:pPr algn="ctr">
+                        <a:buNone/>
+                      </a:pPr>
+                    </a:p>
+                  </a:txBody>
+                  <a:tcPr/>
+                </a:tc>
+                <a:tc>
+                  <a:txBody>
+                    <a:bodyPr/>
+                    <a:p>
+                      <a:pPr algn="ctr">
+                        <a:buNone/>
+                      </a:pPr>
+                    </a:p>
+                  </a:txBody>
+                  <a:tcPr/>
+                </a:tc>
+                <a:tc>
+                  <a:txBody>
+                    <a:bodyPr/>
+                    <a:p>
+                      <a:pPr algn="ctr">
+                        <a:buNone/>
+                      </a:pPr>
+                      <a:r>
+                        <a:rPr lang="pt-BR"/>
+                        <a:t>X</a:t>
+                      </a:r>
+                      <a:endParaRPr lang="pt-BR"/>
+                    </a:p>
+                  </a:txBody>
+                  <a:tcPr/>
+                </a:tc>
+              </a:tr>
+              <a:tr h="381000">
+                <a:tc>
+                  <a:txBody>
+                    <a:bodyPr/>
+                    <a:p>
+                      <a:pPr>
+                        <a:buNone/>
+                      </a:pPr>
+                      <a:r>
+                        <a:rPr lang="pt-BR"/>
+                        <a:t>Desenvolvedor</a:t>
+                      </a:r>
+                      <a:endParaRPr lang="pt-BR"/>
+                    </a:p>
+                  </a:txBody>
+                  <a:tcPr/>
+                </a:tc>
+                <a:tc>
+                  <a:txBody>
+                    <a:bodyPr/>
+                    <a:p>
+                      <a:pPr>
+                        <a:buNone/>
+                      </a:pPr>
+                    </a:p>
+                  </a:txBody>
+                  <a:tcPr/>
+                </a:tc>
+                <a:tc>
+                  <a:txBody>
+                    <a:bodyPr/>
+                    <a:p>
+                      <a:pPr algn="ctr">
+                        <a:buNone/>
+                      </a:pPr>
+                      <a:r>
+                        <a:rPr lang="pt-BR"/>
+                        <a:t>X</a:t>
+                      </a:r>
+                      <a:endParaRPr lang="pt-BR"/>
+                    </a:p>
+                  </a:txBody>
+                  <a:tcPr/>
+                </a:tc>
+                <a:tc>
+                  <a:txBody>
+                    <a:bodyPr/>
+                    <a:p>
+                      <a:pPr algn="ctr">
+                        <a:buNone/>
+                      </a:pPr>
+                      <a:r>
+                        <a:rPr lang="pt-BR"/>
+                        <a:t>X</a:t>
+                      </a:r>
+                      <a:endParaRPr lang="pt-BR"/>
+                    </a:p>
+                  </a:txBody>
+                  <a:tcPr/>
+                </a:tc>
+              </a:tr>
+              <a:tr h="381000">
+                <a:tc>
+                  <a:txBody>
+                    <a:bodyPr/>
+                    <a:p>
+                      <a:pPr>
+                        <a:buNone/>
+                      </a:pPr>
+                      <a:r>
+                        <a:rPr lang="pt-BR"/>
+                        <a:t>Testador</a:t>
+                      </a:r>
+                      <a:endParaRPr lang="pt-BR"/>
+                    </a:p>
+                  </a:txBody>
+                  <a:tcPr/>
+                </a:tc>
+                <a:tc>
+                  <a:txBody>
+                    <a:bodyPr/>
+                    <a:p>
+                      <a:pPr algn="ctr">
+                        <a:buNone/>
+                      </a:pPr>
+                      <a:r>
+                        <a:rPr lang="pt-BR"/>
+                        <a:t>X</a:t>
+                      </a:r>
+                      <a:endParaRPr lang="pt-BR"/>
+                    </a:p>
+                  </a:txBody>
+                  <a:tcPr/>
+                </a:tc>
+                <a:tc>
+                  <a:txBody>
+                    <a:bodyPr/>
+                    <a:p>
+                      <a:pPr>
+                        <a:buNone/>
+                      </a:pPr>
+                    </a:p>
+                  </a:txBody>
+                  <a:tcPr/>
+                </a:tc>
+                <a:tc>
+                  <a:txBody>
+                    <a:bodyPr/>
+                    <a:p>
+                      <a:pPr>
+                        <a:buNone/>
+                      </a:pPr>
+                    </a:p>
+                  </a:txBody>
+                  <a:tcPr/>
+                </a:tc>
+              </a:tr>
+            </a:tbl>
+          </a:graphicData>
+        </a:graphic>
+      </p:graphicFrame>
+    </p:spTree>
+  </p:cSld>
+  <p:clrMapOvr>
+    <a:masterClrMapping/>
+  </p:clrMapOvr>
+</p:sld>
+</file>
+
+<file path=ppt/slides/slide3.xml><?xml version="1.0" encoding="utf-8"?>
+<p:sld xmlns:a="http://schemas.openxmlformats.org/drawingml/2006/main" xmlns:r="http://schemas.openxmlformats.org/officeDocument/2006/relationships" xmlns:p="http://schemas.openxmlformats.org/presentationml/2006/main">
+  <p:cSld>
+    <p:spTree>
+      <p:nvGrpSpPr>
+        <p:cNvPr id="1" name=""/>
+        <p:cNvGrpSpPr/>
+        <p:nvPr/>
+      </p:nvGrpSpPr>
+      <p:grpSpPr/>
+      <p:sp>
+        <p:nvSpPr>
+          <p:cNvPr id="2" name="Título 1"/>
+          <p:cNvSpPr>
+            <a:spLocks noGrp="1"/>
+          </p:cNvSpPr>
+          <p:nvPr>
+            <p:ph type="title"/>
+          </p:nvPr>
+        </p:nvSpPr>
+        <p:spPr/>
+        <p:txBody>
+          <a:bodyPr/>
+          <a:p>
+            <a:r>
+              <a:rPr lang="pt-BR" altLang="en-US"/>
+              <a:t>Objetivos</a:t>
+            </a:r>
+            <a:endParaRPr lang="pt-BR" altLang="en-US"/>
+          </a:p>
+        </p:txBody>
+      </p:sp>
+      <p:sp>
+        <p:nvSpPr>
+          <p:cNvPr id="3" name="Espaço Reservado para Conteúdo 2"/>
+          <p:cNvSpPr>
+            <a:spLocks noGrp="1"/>
+          </p:cNvSpPr>
+          <p:nvPr>
+            <p:ph idx="1"/>
+          </p:nvPr>
+        </p:nvSpPr>
+        <p:spPr/>
+        <p:txBody>
+          <a:bodyPr/>
+          <a:p>
+            <a:r>
+              <a:rPr lang="pt-BR" altLang="en-US"/>
+              <a:t>Aprimorar o gerenciamento do espaço físico da faculdade de informática da PUCRS</a:t>
+            </a:r>
+            <a:endParaRPr lang="pt-BR" altLang="en-US"/>
+          </a:p>
+          <a:p>
+            <a:r>
+              <a:rPr lang="pt-BR" altLang="en-US"/>
+              <a:t>Gerar a melhor alocação possível para as salas e turmas para diminuir, ao máximo, conflitos de horários</a:t>
+            </a:r>
+            <a:endParaRPr lang="pt-BR" altLang="en-US"/>
+          </a:p>
+          <a:p>
+            <a:r>
+              <a:rPr lang="pt-BR" altLang="en-US"/>
+              <a:t>Oferecer mais facilidade ao usuário que utilizará a aplicação</a:t>
+            </a:r>
+            <a:endParaRPr lang="pt-BR" altLang="en-US"/>
+          </a:p>
+        </p:txBody>
+      </p:sp>
+    </p:spTree>
+  </p:cSld>
+  <p:clrMapOvr>
+    <a:masterClrMapping/>
+  </p:clrMapOvr>
+</p:sld>
+</file>
+
+<file path=ppt/slides/slide4.xml><?xml version="1.0" encoding="utf-8"?>
+<p:sld xmlns:a="http://schemas.openxmlformats.org/drawingml/2006/main" xmlns:r="http://schemas.openxmlformats.org/officeDocument/2006/relationships" xmlns:p="http://schemas.openxmlformats.org/presentationml/2006/main">
+  <p:cSld>
+    <p:spTree>
+      <p:nvGrpSpPr>
+        <p:cNvPr id="1" name=""/>
+        <p:cNvGrpSpPr/>
+        <p:nvPr/>
+      </p:nvGrpSpPr>
+      <p:grpSpPr/>
+      <p:sp>
+        <p:nvSpPr>
+          <p:cNvPr id="2" name="Título 1"/>
+          <p:cNvSpPr>
+            <a:spLocks noGrp="1"/>
+          </p:cNvSpPr>
+          <p:nvPr>
+            <p:ph type="title"/>
+          </p:nvPr>
+        </p:nvSpPr>
+        <p:spPr/>
+        <p:txBody>
+          <a:bodyPr/>
+          <a:p>
+            <a:r>
+              <a:rPr lang="pt-BR" altLang="en-US"/>
+              <a:t>Escopo</a:t>
+            </a:r>
+            <a:endParaRPr lang="pt-BR" altLang="en-US"/>
+          </a:p>
+        </p:txBody>
+      </p:sp>
+      <p:sp>
+        <p:nvSpPr>
+          <p:cNvPr id="3" name="Espaço Reservado para Conteúdo 2"/>
+          <p:cNvSpPr>
+            <a:spLocks noGrp="1"/>
+          </p:cNvSpPr>
+          <p:nvPr>
+            <p:ph idx="1"/>
+          </p:nvPr>
+        </p:nvSpPr>
+        <p:spPr/>
+        <p:txBody>
+          <a:bodyPr/>
+          <a:p>
+            <a:r>
+              <a:rPr lang="pt-BR" altLang="en-US"/>
+              <a:t>A aplicação será web e terá como base </a:t>
+            </a:r>
+            <a:r>
+              <a:rPr lang="pt-BR" altLang="en-US">
+                <a:sym typeface="+mn-ea"/>
+              </a:rPr>
+              <a:t>Laravel,</a:t>
+            </a:r>
+            <a:r>
+              <a:rPr lang="pt-BR" altLang="en-US"/>
+              <a:t> um framework de PHP</a:t>
+            </a:r>
+            <a:endParaRPr lang="pt-BR" altLang="en-US"/>
+          </a:p>
+          <a:p>
+            <a:r>
+              <a:rPr lang="pt-BR" altLang="en-US"/>
+              <a:t>O servidor será alocado na Amazon Web Services (AWS), assim como o banco de dados</a:t>
+            </a:r>
+            <a:endParaRPr lang="pt-BR" altLang="en-US"/>
+          </a:p>
+          <a:p>
+            <a:r>
+              <a:rPr lang="pt-BR" altLang="en-US"/>
+              <a:t>A aplicação oferecerá, além da geração de novas alocações, alteração das mesmas, feedback de alterações feitas no sistema e a adição de novas salas e turmas</a:t>
+            </a:r>
+            <a:endParaRPr lang="pt-BR" altLang="en-US"/>
+          </a:p>
+        </p:txBody>
+      </p:sp>
+    </p:spTree>
+  </p:cSld>
+  <p:clrMapOvr>
+    <a:masterClrMapping/>
+  </p:clrMapOvr>
+</p:sld>
+</file>
+
+<file path=ppt/slides/slide5.xml><?xml version="1.0" encoding="utf-8"?>
+<p:sld xmlns:a="http://schemas.openxmlformats.org/drawingml/2006/main" xmlns:r="http://schemas.openxmlformats.org/officeDocument/2006/relationships" xmlns:p="http://schemas.openxmlformats.org/presentationml/2006/main">
+  <p:cSld>
+    <p:spTree>
+      <p:nvGrpSpPr>
+        <p:cNvPr id="1" name=""/>
+        <p:cNvGrpSpPr/>
+        <p:nvPr/>
+      </p:nvGrpSpPr>
+      <p:grpSpPr/>
+      <p:sp>
+        <p:nvSpPr>
+          <p:cNvPr id="2" name="Título 1"/>
+          <p:cNvSpPr>
+            <a:spLocks noGrp="1"/>
+          </p:cNvSpPr>
+          <p:nvPr>
+            <p:ph type="title"/>
+          </p:nvPr>
+        </p:nvSpPr>
+        <p:spPr/>
+        <p:txBody>
+          <a:bodyPr/>
+          <a:p>
+            <a:r>
+              <a:rPr lang="pt-BR" altLang="en-US"/>
+              <a:t>Marcos do Projeto</a:t>
+            </a:r>
+            <a:endParaRPr lang="pt-BR" altLang="en-US"/>
+          </a:p>
+        </p:txBody>
+      </p:sp>
+      <p:sp>
+        <p:nvSpPr>
+          <p:cNvPr id="3" name="Espaço Reservado para Conteúdo 2"/>
+          <p:cNvSpPr>
+            <a:spLocks noGrp="1"/>
+          </p:cNvSpPr>
+          <p:nvPr>
+            <p:ph idx="1"/>
+          </p:nvPr>
+        </p:nvSpPr>
+        <p:spPr>
+          <a:xfrm>
+            <a:off x="457200" y="1600200"/>
+            <a:ext cx="8229600" cy="4860290"/>
+          </a:xfrm>
+        </p:spPr>
+        <p:txBody>
+          <a:bodyPr>
+            <a:normAutofit lnSpcReduction="10000"/>
+          </a:bodyPr>
+          <a:p>
+            <a:r>
+              <a:rPr lang="pt-BR" altLang="en-US" sz="2000"/>
+              <a:t>06/20 - Início do projeto</a:t>
+            </a:r>
+            <a:endParaRPr lang="pt-BR" altLang="en-US" sz="2000"/>
+          </a:p>
+          <a:p>
+            <a:r>
+              <a:rPr lang="pt-BR" altLang="en-US" sz="2000"/>
+              <a:t>20/09 - Projeto planejado e documentado devidadmente</a:t>
+            </a:r>
+            <a:endParaRPr lang="pt-BR" altLang="en-US" sz="2000"/>
+          </a:p>
+          <a:p>
+            <a:r>
+              <a:rPr lang="pt-BR" altLang="en-US" sz="2000"/>
+              <a:t>28/09 - Análise das ferramentas que serão utilizadas</a:t>
+            </a:r>
+            <a:endParaRPr lang="pt-BR" altLang="en-US" sz="2000"/>
+          </a:p>
+          <a:p>
+            <a:r>
+              <a:rPr lang="pt-BR" altLang="en-US" sz="2000"/>
+              <a:t>25/10 - Arquitetura do sistema criada e testada, cadastro de dados acadêmicos e de espaço físico prontos e testados</a:t>
+            </a:r>
+            <a:endParaRPr lang="pt-BR" altLang="en-US" sz="2000"/>
+          </a:p>
+          <a:p>
+            <a:r>
+              <a:rPr lang="pt-BR" altLang="en-US" sz="2000"/>
+              <a:t>12/10 - Consulta de dados de salas sem turma e turmas sem alocação funcionando corretamente</a:t>
+            </a:r>
+            <a:endParaRPr lang="pt-BR" altLang="en-US" sz="2000"/>
+          </a:p>
+          <a:p>
+            <a:r>
+              <a:rPr lang="pt-BR" altLang="en-US" sz="2000"/>
+              <a:t>29/11 - Relatório para feedback de alterações implementado e funcionando</a:t>
+            </a:r>
+            <a:endParaRPr lang="pt-BR" altLang="en-US" sz="2000"/>
+          </a:p>
+          <a:p>
+            <a:r>
+              <a:rPr lang="pt-BR" altLang="en-US" sz="2000"/>
+              <a:t>15/12 - Funções principais como geração de alocações, consultas de alocações, alteração de alocações prontas e testadas devidamente</a:t>
+            </a:r>
+            <a:endParaRPr lang="pt-BR" altLang="en-US" sz="2000"/>
+          </a:p>
+          <a:p>
+            <a:r>
+              <a:rPr lang="pt-BR" altLang="en-US" sz="2000"/>
+              <a:t>15/01 - Importação de dados implementada, sistema pronto para deploy na máquina do cliente</a:t>
+            </a:r>
+            <a:endParaRPr lang="pt-BR" altLang="en-US" sz="2000"/>
+          </a:p>
+          <a:p>
+            <a:r>
+              <a:rPr lang="pt-BR" altLang="en-US" sz="2000"/>
+              <a:t>20/01 - Sistema operando na maquina do cliente com sucesso</a:t>
+            </a:r>
+            <a:endParaRPr lang="pt-BR" altLang="en-US" sz="2000"/>
+          </a:p>
+        </p:txBody>
+      </p:sp>
+    </p:spTree>
+  </p:cSld>
+  <p:clrMapOvr>
+    <a:masterClrMapping/>
+  </p:clrMapOvr>
+</p:sld>
+</file>
+
+<file path=ppt/slides/slide6.xml><?xml version="1.0" encoding="utf-8"?>
+<p:sld xmlns:a="http://schemas.openxmlformats.org/drawingml/2006/main" xmlns:r="http://schemas.openxmlformats.org/officeDocument/2006/relationships" xmlns:p="http://schemas.openxmlformats.org/presentationml/2006/main">
+  <p:cSld>
+    <p:spTree>
+      <p:nvGrpSpPr>
+        <p:cNvPr id="1" name=""/>
+        <p:cNvGrpSpPr/>
+        <p:nvPr/>
+      </p:nvGrpSpPr>
+      <p:grpSpPr/>
+      <p:sp>
+        <p:nvSpPr>
+          <p:cNvPr id="4" name="Título 3"/>
+          <p:cNvSpPr>
+            <a:spLocks noGrp="1"/>
+          </p:cNvSpPr>
+          <p:nvPr>
+            <p:ph type="ctrTitle"/>
+          </p:nvPr>
+        </p:nvSpPr>
+        <p:spPr/>
+        <p:txBody>
+          <a:bodyPr/>
+          <a:p>
+            <a:r>
+              <a:rPr lang="pt-BR" altLang="en-US"/>
+              <a:t>Conclusão da Fase de Elaboração</a:t>
+            </a:r>
+            <a:endParaRPr lang="pt-BR" altLang="en-US"/>
+          </a:p>
+        </p:txBody>
+      </p:sp>
+      <p:sp>
+        <p:nvSpPr>
+          <p:cNvPr id="5" name="Subtítulo 4"/>
+          <p:cNvSpPr>
+            <a:spLocks noGrp="1"/>
+          </p:cNvSpPr>
+          <p:nvPr>
+            <p:ph type="subTitle" idx="1"/>
+          </p:nvPr>
+        </p:nvSpPr>
+        <p:spPr/>
+        <p:txBody>
+          <a:bodyPr/>
+          <a:p>
+            <a:endParaRPr lang="pt-BR" altLang="en-US"/>
+          </a:p>
+        </p:txBody>
+      </p:sp>
+    </p:spTree>
+  </p:cSld>
+  <p:clrMapOvr>
+    <a:masterClrMapping/>
+  </p:clrMapOvr>
+</p:sld>
+</file>
+
+<file path=ppt/slides/slide7.xml><?xml version="1.0" encoding="utf-8"?>
+<p:sld xmlns:a="http://schemas.openxmlformats.org/drawingml/2006/main" xmlns:r="http://schemas.openxmlformats.org/officeDocument/2006/relationships" xmlns:p="http://schemas.openxmlformats.org/presentationml/2006/main">
+  <p:cSld>
+    <p:spTree>
+      <p:nvGrpSpPr>
+        <p:cNvPr id="1" name=""/>
+        <p:cNvGrpSpPr/>
+        <p:nvPr/>
+      </p:nvGrpSpPr>
+      <p:grpSpPr/>
+      <p:sp>
+        <p:nvSpPr>
+          <p:cNvPr id="2" name="Título 1"/>
+          <p:cNvSpPr>
+            <a:spLocks noGrp="1"/>
+          </p:cNvSpPr>
+          <p:nvPr>
+            <p:ph type="title"/>
+          </p:nvPr>
+        </p:nvSpPr>
+        <p:spPr/>
+        <p:txBody>
+          <a:bodyPr/>
+          <a:p>
+            <a:r>
+              <a:rPr lang="pt-BR" altLang="en-US"/>
+              <a:t>Arquitetura do Sistema</a:t>
+            </a:r>
+            <a:endParaRPr lang="pt-BR" altLang="en-US"/>
+          </a:p>
+        </p:txBody>
+      </p:sp>
+      <p:sp>
+        <p:nvSpPr>
+          <p:cNvPr id="3" name="Espaço Reservado para Conteúdo 2"/>
+          <p:cNvSpPr>
+            <a:spLocks noGrp="1"/>
+          </p:cNvSpPr>
+          <p:nvPr>
+            <p:ph idx="1"/>
+          </p:nvPr>
+        </p:nvSpPr>
+        <p:spPr/>
+        <p:txBody>
+          <a:bodyPr/>
+          <a:p>
+            <a:endParaRPr lang="pt-BR" altLang="en-US"/>
+          </a:p>
+        </p:txBody>
+      </p:sp>
+    </p:spTree>
+  </p:cSld>
+  <p:clrMapOvr>
+    <a:masterClrMapping/>
+  </p:clrMapOvr>
+</p:sld>
+</file>
+
+<file path=ppt/slides/slide8.xml><?xml version="1.0" encoding="utf-8"?>
+<p:sld xmlns:a="http://schemas.openxmlformats.org/drawingml/2006/main" xmlns:r="http://schemas.openxmlformats.org/officeDocument/2006/relationships" xmlns:p="http://schemas.openxmlformats.org/presentationml/2006/main">
+  <p:cSld>
+    <p:spTree>
+      <p:nvGrpSpPr>
+        <p:cNvPr id="1" name=""/>
+        <p:cNvGrpSpPr/>
+        <p:nvPr/>
+      </p:nvGrpSpPr>
+      <p:grpSpPr/>
+      <p:sp>
+        <p:nvSpPr>
+          <p:cNvPr id="2" name="Título 1"/>
+          <p:cNvSpPr>
+            <a:spLocks noGrp="1"/>
+          </p:cNvSpPr>
+          <p:nvPr>
+            <p:ph type="title"/>
+          </p:nvPr>
+        </p:nvSpPr>
+        <p:spPr/>
+        <p:txBody>
+          <a:bodyPr/>
+          <a:p>
+            <a:r>
+              <a:rPr lang="pt-BR" altLang="en-US"/>
+              <a:t>Casos de Uso</a:t>
+            </a:r>
+            <a:endParaRPr lang="pt-BR" altLang="en-US"/>
+          </a:p>
+        </p:txBody>
+      </p:sp>
+      <p:sp>
+        <p:nvSpPr>
+          <p:cNvPr id="3" name="Espaço Reservado para Conteúdo 2"/>
+          <p:cNvSpPr>
+            <a:spLocks noGrp="1"/>
+          </p:cNvSpPr>
+          <p:nvPr>
+            <p:ph idx="1"/>
+          </p:nvPr>
+        </p:nvSpPr>
+        <p:spPr/>
+        <p:txBody>
+          <a:bodyPr/>
+          <a:p>
+            <a:endParaRPr lang="pt-BR" altLang="en-US"/>
+          </a:p>
+        </p:txBody>
+      </p:sp>
+    </p:spTree>
+  </p:cSld>
+  <p:clrMapOvr>
+    <a:masterClrMapping/>
+  </p:clrMapOvr>
+</p:sld>
+</file>
+
+<file path=ppt/slides/slide9.xml><?xml version="1.0" encoding="utf-8"?>
+<p:sld xmlns:a="http://schemas.openxmlformats.org/drawingml/2006/main" xmlns:r="http://schemas.openxmlformats.org/officeDocument/2006/relationships" xmlns:p="http://schemas.openxmlformats.org/presentationml/2006/main">
+  <p:cSld>
+    <p:spTree>
+      <p:nvGrpSpPr>
+        <p:cNvPr id="1" name=""/>
+        <p:cNvGrpSpPr/>
+        <p:nvPr/>
+      </p:nvGrpSpPr>
+      <p:grpSpPr/>
+      <p:sp>
+        <p:nvSpPr>
+          <p:cNvPr id="2" name="Título 1"/>
+          <p:cNvSpPr>
+            <a:spLocks noGrp="1"/>
+          </p:cNvSpPr>
+          <p:nvPr>
+            <p:ph type="title"/>
+          </p:nvPr>
+        </p:nvSpPr>
+        <p:spPr/>
+        <p:txBody>
+          <a:bodyPr/>
+          <a:p>
+            <a:r>
+              <a:rPr lang="pt-BR" altLang="en-US"/>
+              <a:t>Protótipo</a:t>
+            </a:r>
+            <a:endParaRPr lang="pt-BR" altLang="en-US"/>
+          </a:p>
+        </p:txBody>
+      </p:sp>
+      <p:sp>
+        <p:nvSpPr>
+          <p:cNvPr id="3" name="Espaço Reservado para Conteúdo 2"/>
+          <p:cNvSpPr>
+            <a:spLocks noGrp="1"/>
+          </p:cNvSpPr>
+          <p:nvPr>
+            <p:ph idx="1"/>
+          </p:nvPr>
+        </p:nvSpPr>
+        <p:spPr/>
+        <p:txBody>
+          <a:bodyPr/>
+          <a:p>
+            <a:endParaRPr lang="pt-BR" altLang="en-US"/>
+          </a:p>
+        </p:txBody>
+      </p:sp>
+    </p:spTree>
   </p:cSld>
   <p:clrMapOvr>
     <a:masterClrMapping/>
@@ -3432,5 +4326,10 @@
   </a:themeElements>
   <a:objectDefaults/>
   <a:extraClrSchemeLst/>
+  <a:extLst>
+    <a:ext uri="{05A4C25C-085E-4340-85A3-A5531E510DB2}">
+      <thm15:themeFamily xmlns:thm15="http://schemas.microsoft.com/office/thememl/2012/main" name="Office Theme" id="{62F939B6-93AF-4DB8-9C6B-D6C7DFDC589F}" vid="{4A3C46E8-61CC-4603-A589-7422A47A8E4A}"/>
+    </a:ext>
+  </a:extLst>
 </a:theme>
 </file>
</xml_diff>